<commit_message>
updated intro to all of us powerpoint
</commit_message>
<xml_diff>
--- a/Session 1/Intro to All of Us.pptx
+++ b/Session 1/Intro to All of Us.pptx
@@ -177,7 +177,7 @@
 <file path=ppt/revisionInfo.xml><?xml version="1.0" encoding="utf-8"?>
 <p1510:revInfo xmlns:a="http://schemas.openxmlformats.org/drawingml/2006/main" xmlns:r="http://schemas.openxmlformats.org/officeDocument/2006/relationships" xmlns:p1510="http://schemas.microsoft.com/office/powerpoint/2015/10/main">
   <p1510:revLst>
-    <p1510:client id="{FD5EC9EE-F02B-5C4D-B99E-BFF61144BBC9}" v="186" dt="2025-11-07T18:13:29.873"/>
+    <p1510:client id="{0DF766A2-EDB3-0345-A196-1329D99E18C2}" v="6" dt="2025-11-10T15:20:49.475"/>
   </p1510:revLst>
 </p1510:revInfo>
 </file>
@@ -187,7 +187,7 @@
   <pc:docChgLst>
     <pc:chgData name="Wegener, Maximilian" userId="00319a47-5df7-4a7f-b5fd-8c1aef3f7443" providerId="ADAL" clId="{CF2CAE99-D8F5-51A4-A68C-79C1C32033F6}"/>
     <pc:docChg chg="undo custSel addSld delSld modSld sldOrd">
-      <pc:chgData name="Wegener, Maximilian" userId="00319a47-5df7-4a7f-b5fd-8c1aef3f7443" providerId="ADAL" clId="{CF2CAE99-D8F5-51A4-A68C-79C1C32033F6}" dt="2025-11-07T18:13:44.793" v="1877" actId="1076"/>
+      <pc:chgData name="Wegener, Maximilian" userId="00319a47-5df7-4a7f-b5fd-8c1aef3f7443" providerId="ADAL" clId="{CF2CAE99-D8F5-51A4-A68C-79C1C32033F6}" dt="2025-11-10T15:20:42.094" v="2450" actId="20577"/>
       <pc:docMkLst>
         <pc:docMk/>
       </pc:docMkLst>
@@ -197,14 +197,6 @@
           <pc:docMk/>
           <pc:sldMk cId="3091722252" sldId="262"/>
         </pc:sldMkLst>
-        <pc:spChg chg="del">
-          <ac:chgData name="Wegener, Maximilian" userId="00319a47-5df7-4a7f-b5fd-8c1aef3f7443" providerId="ADAL" clId="{CF2CAE99-D8F5-51A4-A68C-79C1C32033F6}" dt="2025-11-07T14:23:45.789" v="242" actId="478"/>
-          <ac:spMkLst>
-            <pc:docMk/>
-            <pc:sldMk cId="3091722252" sldId="262"/>
-            <ac:spMk id="7" creationId="{2A978F19-9F06-BBE4-2FAD-705ADFABA8E3}"/>
-          </ac:spMkLst>
-        </pc:spChg>
       </pc:sldChg>
       <pc:sldChg chg="modSp mod modNotesTx">
         <pc:chgData name="Wegener, Maximilian" userId="00319a47-5df7-4a7f-b5fd-8c1aef3f7443" providerId="ADAL" clId="{CF2CAE99-D8F5-51A4-A68C-79C1C32033F6}" dt="2025-11-07T14:25:39.319" v="247" actId="20577"/>
@@ -237,6 +229,29 @@
         </pc:spChg>
       </pc:sldChg>
       <pc:sldChg chg="modSp mod">
+        <pc:chgData name="Wegener, Maximilian" userId="00319a47-5df7-4a7f-b5fd-8c1aef3f7443" providerId="ADAL" clId="{CF2CAE99-D8F5-51A4-A68C-79C1C32033F6}" dt="2025-11-10T15:01:26.969" v="2011" actId="1036"/>
+        <pc:sldMkLst>
+          <pc:docMk/>
+          <pc:sldMk cId="3349447059" sldId="367"/>
+        </pc:sldMkLst>
+        <pc:spChg chg="mod">
+          <ac:chgData name="Wegener, Maximilian" userId="00319a47-5df7-4a7f-b5fd-8c1aef3f7443" providerId="ADAL" clId="{CF2CAE99-D8F5-51A4-A68C-79C1C32033F6}" dt="2025-11-10T15:01:21.090" v="2003" actId="1035"/>
+          <ac:spMkLst>
+            <pc:docMk/>
+            <pc:sldMk cId="3349447059" sldId="367"/>
+            <ac:spMk id="2" creationId="{AE682C57-D543-F24B-FDEE-8F91727E4CF3}"/>
+          </ac:spMkLst>
+        </pc:spChg>
+        <pc:picChg chg="mod">
+          <ac:chgData name="Wegener, Maximilian" userId="00319a47-5df7-4a7f-b5fd-8c1aef3f7443" providerId="ADAL" clId="{CF2CAE99-D8F5-51A4-A68C-79C1C32033F6}" dt="2025-11-10T15:01:26.969" v="2011" actId="1036"/>
+          <ac:picMkLst>
+            <pc:docMk/>
+            <pc:sldMk cId="3349447059" sldId="367"/>
+            <ac:picMk id="5" creationId="{0935A675-8DBD-9DFD-B6C5-979DEEB9D92F}"/>
+          </ac:picMkLst>
+        </pc:picChg>
+      </pc:sldChg>
+      <pc:sldChg chg="modSp mod">
         <pc:chgData name="Wegener, Maximilian" userId="00319a47-5df7-4a7f-b5fd-8c1aef3f7443" providerId="ADAL" clId="{CF2CAE99-D8F5-51A4-A68C-79C1C32033F6}" dt="2025-11-07T14:40:35.556" v="535" actId="20577"/>
         <pc:sldMkLst>
           <pc:docMk/>
@@ -248,6 +263,51 @@
             <pc:docMk/>
             <pc:sldMk cId="2367016627" sldId="368"/>
             <ac:spMk id="7" creationId="{20166998-8E29-B59E-0AC6-67C25E4B7748}"/>
+          </ac:spMkLst>
+        </pc:spChg>
+      </pc:sldChg>
+      <pc:sldChg chg="modSp mod">
+        <pc:chgData name="Wegener, Maximilian" userId="00319a47-5df7-4a7f-b5fd-8c1aef3f7443" providerId="ADAL" clId="{CF2CAE99-D8F5-51A4-A68C-79C1C32033F6}" dt="2025-11-10T15:03:12.705" v="2017" actId="20577"/>
+        <pc:sldMkLst>
+          <pc:docMk/>
+          <pc:sldMk cId="1533948127" sldId="370"/>
+        </pc:sldMkLst>
+        <pc:spChg chg="mod">
+          <ac:chgData name="Wegener, Maximilian" userId="00319a47-5df7-4a7f-b5fd-8c1aef3f7443" providerId="ADAL" clId="{CF2CAE99-D8F5-51A4-A68C-79C1C32033F6}" dt="2025-11-10T15:03:12.705" v="2017" actId="20577"/>
+          <ac:spMkLst>
+            <pc:docMk/>
+            <pc:sldMk cId="1533948127" sldId="370"/>
+            <ac:spMk id="15" creationId="{C8DAB06A-F7DF-4757-88BF-448AB21CF2BB}"/>
+          </ac:spMkLst>
+        </pc:spChg>
+      </pc:sldChg>
+      <pc:sldChg chg="modSp mod">
+        <pc:chgData name="Wegener, Maximilian" userId="00319a47-5df7-4a7f-b5fd-8c1aef3f7443" providerId="ADAL" clId="{CF2CAE99-D8F5-51A4-A68C-79C1C32033F6}" dt="2025-11-10T15:18:31.226" v="2391" actId="403"/>
+        <pc:sldMkLst>
+          <pc:docMk/>
+          <pc:sldMk cId="296703054" sldId="374"/>
+        </pc:sldMkLst>
+        <pc:spChg chg="mod">
+          <ac:chgData name="Wegener, Maximilian" userId="00319a47-5df7-4a7f-b5fd-8c1aef3f7443" providerId="ADAL" clId="{CF2CAE99-D8F5-51A4-A68C-79C1C32033F6}" dt="2025-11-10T15:18:31.226" v="2391" actId="403"/>
+          <ac:spMkLst>
+            <pc:docMk/>
+            <pc:sldMk cId="296703054" sldId="374"/>
+            <ac:spMk id="2" creationId="{9961C6D7-9F1E-ACDF-95A9-02BFB7019855}"/>
+          </ac:spMkLst>
+        </pc:spChg>
+      </pc:sldChg>
+      <pc:sldChg chg="modSp mod">
+        <pc:chgData name="Wegener, Maximilian" userId="00319a47-5df7-4a7f-b5fd-8c1aef3f7443" providerId="ADAL" clId="{CF2CAE99-D8F5-51A4-A68C-79C1C32033F6}" dt="2025-11-10T15:20:42.094" v="2450" actId="20577"/>
+        <pc:sldMkLst>
+          <pc:docMk/>
+          <pc:sldMk cId="2763619890" sldId="376"/>
+        </pc:sldMkLst>
+        <pc:spChg chg="mod">
+          <ac:chgData name="Wegener, Maximilian" userId="00319a47-5df7-4a7f-b5fd-8c1aef3f7443" providerId="ADAL" clId="{CF2CAE99-D8F5-51A4-A68C-79C1C32033F6}" dt="2025-11-10T15:20:42.094" v="2450" actId="20577"/>
+          <ac:spMkLst>
+            <pc:docMk/>
+            <pc:sldMk cId="2763619890" sldId="376"/>
+            <ac:spMk id="2" creationId="{98F8968C-B95C-2579-DCAC-B5038E468C5E}"/>
           </ac:spMkLst>
         </pc:spChg>
       </pc:sldChg>
@@ -402,7 +462,7 @@
         </pc:picChg>
       </pc:sldChg>
       <pc:sldChg chg="addSp delSp modSp new mod ord modNotesTx">
-        <pc:chgData name="Wegener, Maximilian" userId="00319a47-5df7-4a7f-b5fd-8c1aef3f7443" providerId="ADAL" clId="{CF2CAE99-D8F5-51A4-A68C-79C1C32033F6}" dt="2025-11-07T16:51:57.930" v="1545" actId="20577"/>
+        <pc:chgData name="Wegener, Maximilian" userId="00319a47-5df7-4a7f-b5fd-8c1aef3f7443" providerId="ADAL" clId="{CF2CAE99-D8F5-51A4-A68C-79C1C32033F6}" dt="2025-11-10T15:06:29.529" v="2037" actId="20577"/>
         <pc:sldMkLst>
           <pc:docMk/>
           <pc:sldMk cId="1184809725" sldId="407"/>
@@ -424,99 +484,11 @@
           </ac:spMkLst>
         </pc:spChg>
         <pc:spChg chg="mod">
-          <ac:chgData name="Wegener, Maximilian" userId="00319a47-5df7-4a7f-b5fd-8c1aef3f7443" providerId="ADAL" clId="{CF2CAE99-D8F5-51A4-A68C-79C1C32033F6}" dt="2025-11-07T16:51:04.166" v="1541" actId="20577"/>
+          <ac:chgData name="Wegener, Maximilian" userId="00319a47-5df7-4a7f-b5fd-8c1aef3f7443" providerId="ADAL" clId="{CF2CAE99-D8F5-51A4-A68C-79C1C32033F6}" dt="2025-11-10T15:06:29.529" v="2037" actId="20577"/>
           <ac:spMkLst>
             <pc:docMk/>
             <pc:sldMk cId="1184809725" sldId="407"/>
             <ac:spMk id="4" creationId="{A996235D-2199-7FC7-EEB5-5A27AABD9165}"/>
-          </ac:spMkLst>
-        </pc:spChg>
-        <pc:spChg chg="add del mod">
-          <ac:chgData name="Wegener, Maximilian" userId="00319a47-5df7-4a7f-b5fd-8c1aef3f7443" providerId="ADAL" clId="{CF2CAE99-D8F5-51A4-A68C-79C1C32033F6}" dt="2025-11-07T16:42:27.154" v="1442" actId="478"/>
-          <ac:spMkLst>
-            <pc:docMk/>
-            <pc:sldMk cId="1184809725" sldId="407"/>
-            <ac:spMk id="6" creationId="{7241799F-C53C-28FB-A1BD-C093ADE2AC84}"/>
-          </ac:spMkLst>
-        </pc:spChg>
-        <pc:spChg chg="add del mod">
-          <ac:chgData name="Wegener, Maximilian" userId="00319a47-5df7-4a7f-b5fd-8c1aef3f7443" providerId="ADAL" clId="{CF2CAE99-D8F5-51A4-A68C-79C1C32033F6}" dt="2025-11-07T15:45:52.035" v="612" actId="478"/>
-          <ac:spMkLst>
-            <pc:docMk/>
-            <pc:sldMk cId="1184809725" sldId="407"/>
-            <ac:spMk id="7" creationId="{27C86581-67AA-BE19-C9C3-376E9C61729C}"/>
-          </ac:spMkLst>
-        </pc:spChg>
-        <pc:spChg chg="add del mod">
-          <ac:chgData name="Wegener, Maximilian" userId="00319a47-5df7-4a7f-b5fd-8c1aef3f7443" providerId="ADAL" clId="{CF2CAE99-D8F5-51A4-A68C-79C1C32033F6}" dt="2025-11-07T15:46:00.654" v="616" actId="478"/>
-          <ac:spMkLst>
-            <pc:docMk/>
-            <pc:sldMk cId="1184809725" sldId="407"/>
-            <ac:spMk id="8" creationId="{3F9E5CF7-192E-4B3E-9519-9A38985D4290}"/>
-          </ac:spMkLst>
-        </pc:spChg>
-        <pc:spChg chg="add del mod">
-          <ac:chgData name="Wegener, Maximilian" userId="00319a47-5df7-4a7f-b5fd-8c1aef3f7443" providerId="ADAL" clId="{CF2CAE99-D8F5-51A4-A68C-79C1C32033F6}" dt="2025-11-07T15:46:07.818" v="619" actId="478"/>
-          <ac:spMkLst>
-            <pc:docMk/>
-            <pc:sldMk cId="1184809725" sldId="407"/>
-            <ac:spMk id="9" creationId="{CF0C9202-09D6-1EA1-2065-013A2A66C373}"/>
-          </ac:spMkLst>
-        </pc:spChg>
-        <pc:spChg chg="add del mod">
-          <ac:chgData name="Wegener, Maximilian" userId="00319a47-5df7-4a7f-b5fd-8c1aef3f7443" providerId="ADAL" clId="{CF2CAE99-D8F5-51A4-A68C-79C1C32033F6}" dt="2025-11-07T15:46:23.079" v="625" actId="478"/>
-          <ac:spMkLst>
-            <pc:docMk/>
-            <pc:sldMk cId="1184809725" sldId="407"/>
-            <ac:spMk id="10" creationId="{82B47172-2F3B-EC42-1A5A-E8E4D720C8DC}"/>
-          </ac:spMkLst>
-        </pc:spChg>
-        <pc:spChg chg="add del mod">
-          <ac:chgData name="Wegener, Maximilian" userId="00319a47-5df7-4a7f-b5fd-8c1aef3f7443" providerId="ADAL" clId="{CF2CAE99-D8F5-51A4-A68C-79C1C32033F6}" dt="2025-11-07T15:51:22.273" v="818"/>
-          <ac:spMkLst>
-            <pc:docMk/>
-            <pc:sldMk cId="1184809725" sldId="407"/>
-            <ac:spMk id="11" creationId="{820CA448-3534-925D-4368-FB7CEBEFFDD7}"/>
-          </ac:spMkLst>
-        </pc:spChg>
-        <pc:spChg chg="add del mod">
-          <ac:chgData name="Wegener, Maximilian" userId="00319a47-5df7-4a7f-b5fd-8c1aef3f7443" providerId="ADAL" clId="{CF2CAE99-D8F5-51A4-A68C-79C1C32033F6}" dt="2025-11-07T15:51:22.660" v="820"/>
-          <ac:spMkLst>
-            <pc:docMk/>
-            <pc:sldMk cId="1184809725" sldId="407"/>
-            <ac:spMk id="12" creationId="{7D1AC647-1F72-4CD3-7D8D-297BA9FA2A7B}"/>
-          </ac:spMkLst>
-        </pc:spChg>
-        <pc:spChg chg="add del mod">
-          <ac:chgData name="Wegener, Maximilian" userId="00319a47-5df7-4a7f-b5fd-8c1aef3f7443" providerId="ADAL" clId="{CF2CAE99-D8F5-51A4-A68C-79C1C32033F6}" dt="2025-11-07T16:09:54.913" v="1068"/>
-          <ac:spMkLst>
-            <pc:docMk/>
-            <pc:sldMk cId="1184809725" sldId="407"/>
-            <ac:spMk id="13" creationId="{F3D39DEB-3508-67F2-A4E7-F5644856F4AB}"/>
-          </ac:spMkLst>
-        </pc:spChg>
-        <pc:spChg chg="add del mod">
-          <ac:chgData name="Wegener, Maximilian" userId="00319a47-5df7-4a7f-b5fd-8c1aef3f7443" providerId="ADAL" clId="{CF2CAE99-D8F5-51A4-A68C-79C1C32033F6}" dt="2025-11-07T16:09:55.113" v="1070"/>
-          <ac:spMkLst>
-            <pc:docMk/>
-            <pc:sldMk cId="1184809725" sldId="407"/>
-            <ac:spMk id="14" creationId="{1D9FFCF5-CCCC-EAEB-86DE-35AB7766E3F5}"/>
-          </ac:spMkLst>
-        </pc:spChg>
-        <pc:spChg chg="add del mod">
-          <ac:chgData name="Wegener, Maximilian" userId="00319a47-5df7-4a7f-b5fd-8c1aef3f7443" providerId="ADAL" clId="{CF2CAE99-D8F5-51A4-A68C-79C1C32033F6}" dt="2025-11-07T16:09:55.114" v="1072"/>
-          <ac:spMkLst>
-            <pc:docMk/>
-            <pc:sldMk cId="1184809725" sldId="407"/>
-            <ac:spMk id="15" creationId="{79AE7228-FBB4-5153-39BE-1BFBB603979D}"/>
-          </ac:spMkLst>
-        </pc:spChg>
-        <pc:spChg chg="add del mod">
-          <ac:chgData name="Wegener, Maximilian" userId="00319a47-5df7-4a7f-b5fd-8c1aef3f7443" providerId="ADAL" clId="{CF2CAE99-D8F5-51A4-A68C-79C1C32033F6}" dt="2025-11-07T16:35:39.519" v="1404"/>
-          <ac:spMkLst>
-            <pc:docMk/>
-            <pc:sldMk cId="1184809725" sldId="407"/>
-            <ac:spMk id="16" creationId="{9763B2F3-43B3-9667-405E-887EA9CB81FF}"/>
           </ac:spMkLst>
         </pc:spChg>
       </pc:sldChg>
@@ -542,22 +514,6 @@
             <ac:spMk id="3" creationId="{7C33F4E8-A94A-72E9-0FE9-2799643F87F7}"/>
           </ac:spMkLst>
         </pc:spChg>
-        <pc:spChg chg="del mod">
-          <ac:chgData name="Wegener, Maximilian" userId="00319a47-5df7-4a7f-b5fd-8c1aef3f7443" providerId="ADAL" clId="{CF2CAE99-D8F5-51A4-A68C-79C1C32033F6}" dt="2025-11-07T14:32:42.428" v="332" actId="478"/>
-          <ac:spMkLst>
-            <pc:docMk/>
-            <pc:sldMk cId="1006352360" sldId="408"/>
-            <ac:spMk id="4" creationId="{1E9C4BC8-E24D-EC52-3BE4-4B5905AA5DDD}"/>
-          </ac:spMkLst>
-        </pc:spChg>
-        <pc:spChg chg="add del mod">
-          <ac:chgData name="Wegener, Maximilian" userId="00319a47-5df7-4a7f-b5fd-8c1aef3f7443" providerId="ADAL" clId="{CF2CAE99-D8F5-51A4-A68C-79C1C32033F6}" dt="2025-11-07T14:32:48.283" v="334" actId="478"/>
-          <ac:spMkLst>
-            <pc:docMk/>
-            <pc:sldMk cId="1006352360" sldId="408"/>
-            <ac:spMk id="7" creationId="{015206CC-748E-DB68-2B32-D0763656898E}"/>
-          </ac:spMkLst>
-        </pc:spChg>
         <pc:spChg chg="mod">
           <ac:chgData name="Wegener, Maximilian" userId="00319a47-5df7-4a7f-b5fd-8c1aef3f7443" providerId="ADAL" clId="{CF2CAE99-D8F5-51A4-A68C-79C1C32033F6}" dt="2025-11-07T14:35:33.871" v="366" actId="404"/>
           <ac:spMkLst>
@@ -573,54 +529,6 @@
           <pc:docMk/>
           <pc:sldMk cId="3342901713" sldId="409"/>
         </pc:sldMkLst>
-        <pc:spChg chg="add del mod">
-          <ac:chgData name="Wegener, Maximilian" userId="00319a47-5df7-4a7f-b5fd-8c1aef3f7443" providerId="ADAL" clId="{CF2CAE99-D8F5-51A4-A68C-79C1C32033F6}" dt="2025-11-07T14:33:58.511" v="345" actId="478"/>
-          <ac:spMkLst>
-            <pc:docMk/>
-            <pc:sldMk cId="3342901713" sldId="409"/>
-            <ac:spMk id="4" creationId="{A29C2460-A095-6BB6-7747-A57B9E4E5DBA}"/>
-          </ac:spMkLst>
-        </pc:spChg>
-        <pc:spChg chg="add del mod">
-          <ac:chgData name="Wegener, Maximilian" userId="00319a47-5df7-4a7f-b5fd-8c1aef3f7443" providerId="ADAL" clId="{CF2CAE99-D8F5-51A4-A68C-79C1C32033F6}" dt="2025-11-07T14:34:06.137" v="348" actId="478"/>
-          <ac:spMkLst>
-            <pc:docMk/>
-            <pc:sldMk cId="3342901713" sldId="409"/>
-            <ac:spMk id="7" creationId="{A0B21B6B-467A-C369-7076-0478E64DBD83}"/>
-          </ac:spMkLst>
-        </pc:spChg>
-        <pc:spChg chg="add del mod">
-          <ac:chgData name="Wegener, Maximilian" userId="00319a47-5df7-4a7f-b5fd-8c1aef3f7443" providerId="ADAL" clId="{CF2CAE99-D8F5-51A4-A68C-79C1C32033F6}" dt="2025-11-07T14:36:19.642" v="370" actId="478"/>
-          <ac:spMkLst>
-            <pc:docMk/>
-            <pc:sldMk cId="3342901713" sldId="409"/>
-            <ac:spMk id="8" creationId="{A69DDD2A-F2FD-FEE4-953B-C17662C25587}"/>
-          </ac:spMkLst>
-        </pc:spChg>
-        <pc:spChg chg="add del mod">
-          <ac:chgData name="Wegener, Maximilian" userId="00319a47-5df7-4a7f-b5fd-8c1aef3f7443" providerId="ADAL" clId="{CF2CAE99-D8F5-51A4-A68C-79C1C32033F6}" dt="2025-11-07T14:36:19.642" v="370" actId="478"/>
-          <ac:spMkLst>
-            <pc:docMk/>
-            <pc:sldMk cId="3342901713" sldId="409"/>
-            <ac:spMk id="9" creationId="{506779D1-2B58-DEEE-A79E-C8A21A6F0D8C}"/>
-          </ac:spMkLst>
-        </pc:spChg>
-        <pc:spChg chg="add del mod">
-          <ac:chgData name="Wegener, Maximilian" userId="00319a47-5df7-4a7f-b5fd-8c1aef3f7443" providerId="ADAL" clId="{CF2CAE99-D8F5-51A4-A68C-79C1C32033F6}" dt="2025-11-07T14:36:19.642" v="370" actId="478"/>
-          <ac:spMkLst>
-            <pc:docMk/>
-            <pc:sldMk cId="3342901713" sldId="409"/>
-            <ac:spMk id="10" creationId="{5C54BAF8-AF23-3D8E-D401-7C2E62562474}"/>
-          </ac:spMkLst>
-        </pc:spChg>
-        <pc:spChg chg="add del mod">
-          <ac:chgData name="Wegener, Maximilian" userId="00319a47-5df7-4a7f-b5fd-8c1aef3f7443" providerId="ADAL" clId="{CF2CAE99-D8F5-51A4-A68C-79C1C32033F6}" dt="2025-11-07T14:36:22.867" v="372" actId="478"/>
-          <ac:spMkLst>
-            <pc:docMk/>
-            <pc:sldMk cId="3342901713" sldId="409"/>
-            <ac:spMk id="12" creationId="{CCDCA31A-6CAB-51D0-8926-836B669FD0E5}"/>
-          </ac:spMkLst>
-        </pc:spChg>
         <pc:spChg chg="add mod">
           <ac:chgData name="Wegener, Maximilian" userId="00319a47-5df7-4a7f-b5fd-8c1aef3f7443" providerId="ADAL" clId="{CF2CAE99-D8F5-51A4-A68C-79C1C32033F6}" dt="2025-11-07T14:36:20.054" v="371"/>
           <ac:spMkLst>
@@ -645,39 +553,15 @@
             <ac:spMk id="15" creationId="{27C6241D-4E4A-070E-168A-9B3D8AC3357E}"/>
           </ac:spMkLst>
         </pc:spChg>
-        <pc:spChg chg="del mod">
-          <ac:chgData name="Wegener, Maximilian" userId="00319a47-5df7-4a7f-b5fd-8c1aef3f7443" providerId="ADAL" clId="{CF2CAE99-D8F5-51A4-A68C-79C1C32033F6}" dt="2025-11-07T14:33:56.362" v="344" actId="478"/>
-          <ac:spMkLst>
-            <pc:docMk/>
-            <pc:sldMk cId="3342901713" sldId="409"/>
-            <ac:spMk id="20" creationId="{90B1BC69-26F4-EAA9-6B67-106B29F04FDB}"/>
-          </ac:spMkLst>
-        </pc:spChg>
-        <pc:spChg chg="del mod">
-          <ac:chgData name="Wegener, Maximilian" userId="00319a47-5df7-4a7f-b5fd-8c1aef3f7443" providerId="ADAL" clId="{CF2CAE99-D8F5-51A4-A68C-79C1C32033F6}" dt="2025-11-07T14:34:03.043" v="347" actId="478"/>
-          <ac:spMkLst>
-            <pc:docMk/>
-            <pc:sldMk cId="3342901713" sldId="409"/>
-            <ac:spMk id="21" creationId="{06108BF9-53E9-46C9-528E-8A079635C608}"/>
-          </ac:spMkLst>
-        </pc:spChg>
-        <pc:spChg chg="del">
-          <ac:chgData name="Wegener, Maximilian" userId="00319a47-5df7-4a7f-b5fd-8c1aef3f7443" providerId="ADAL" clId="{CF2CAE99-D8F5-51A4-A68C-79C1C32033F6}" dt="2025-11-07T14:33:54.593" v="343" actId="478"/>
-          <ac:spMkLst>
-            <pc:docMk/>
-            <pc:sldMk cId="3342901713" sldId="409"/>
-            <ac:spMk id="22" creationId="{7F5E9A3A-5828-DD1E-3B47-E55213C262A5}"/>
-          </ac:spMkLst>
-        </pc:spChg>
       </pc:sldChg>
       <pc:sldChg chg="modSp add mod modNotesTx">
-        <pc:chgData name="Wegener, Maximilian" userId="00319a47-5df7-4a7f-b5fd-8c1aef3f7443" providerId="ADAL" clId="{CF2CAE99-D8F5-51A4-A68C-79C1C32033F6}" dt="2025-11-07T14:38:47.287" v="397" actId="207"/>
+        <pc:chgData name="Wegener, Maximilian" userId="00319a47-5df7-4a7f-b5fd-8c1aef3f7443" providerId="ADAL" clId="{CF2CAE99-D8F5-51A4-A68C-79C1C32033F6}" dt="2025-11-10T14:59:41.558" v="1903" actId="20577"/>
         <pc:sldMkLst>
           <pc:docMk/>
           <pc:sldMk cId="2479410611" sldId="410"/>
         </pc:sldMkLst>
         <pc:spChg chg="mod">
-          <ac:chgData name="Wegener, Maximilian" userId="00319a47-5df7-4a7f-b5fd-8c1aef3f7443" providerId="ADAL" clId="{CF2CAE99-D8F5-51A4-A68C-79C1C32033F6}" dt="2025-11-07T14:38:47.287" v="397" actId="207"/>
+          <ac:chgData name="Wegener, Maximilian" userId="00319a47-5df7-4a7f-b5fd-8c1aef3f7443" providerId="ADAL" clId="{CF2CAE99-D8F5-51A4-A68C-79C1C32033F6}" dt="2025-11-10T14:59:41.558" v="1903" actId="20577"/>
           <ac:spMkLst>
             <pc:docMk/>
             <pc:sldMk cId="2479410611" sldId="410"/>
@@ -693,13 +577,6 @@
           </ac:spMkLst>
         </pc:spChg>
       </pc:sldChg>
-      <pc:sldChg chg="modSp add del mod">
-        <pc:chgData name="Wegener, Maximilian" userId="00319a47-5df7-4a7f-b5fd-8c1aef3f7443" providerId="ADAL" clId="{CF2CAE99-D8F5-51A4-A68C-79C1C32033F6}" dt="2025-11-07T14:25:44.777" v="248" actId="2696"/>
-        <pc:sldMkLst>
-          <pc:docMk/>
-          <pc:sldMk cId="837148515" sldId="411"/>
-        </pc:sldMkLst>
-      </pc:sldChg>
       <pc:sldChg chg="addSp delSp modSp add mod">
         <pc:chgData name="Wegener, Maximilian" userId="00319a47-5df7-4a7f-b5fd-8c1aef3f7443" providerId="ADAL" clId="{CF2CAE99-D8F5-51A4-A68C-79C1C32033F6}" dt="2025-11-07T14:38:30.951" v="396" actId="207"/>
         <pc:sldMkLst>
@@ -712,22 +589,6 @@
             <pc:docMk/>
             <pc:sldMk cId="1241447715" sldId="412"/>
             <ac:spMk id="2" creationId="{403642BE-31ED-1C59-B523-DF446D0B0F15}"/>
-          </ac:spMkLst>
-        </pc:spChg>
-        <pc:spChg chg="del mod">
-          <ac:chgData name="Wegener, Maximilian" userId="00319a47-5df7-4a7f-b5fd-8c1aef3f7443" providerId="ADAL" clId="{CF2CAE99-D8F5-51A4-A68C-79C1C32033F6}" dt="2025-11-07T14:37:10.065" v="374" actId="478"/>
-          <ac:spMkLst>
-            <pc:docMk/>
-            <pc:sldMk cId="1241447715" sldId="412"/>
-            <ac:spMk id="3" creationId="{0BBC2239-A18D-BB8E-8831-E48BE421A2BF}"/>
-          </ac:spMkLst>
-        </pc:spChg>
-        <pc:spChg chg="del mod">
-          <ac:chgData name="Wegener, Maximilian" userId="00319a47-5df7-4a7f-b5fd-8c1aef3f7443" providerId="ADAL" clId="{CF2CAE99-D8F5-51A4-A68C-79C1C32033F6}" dt="2025-11-07T14:37:15.154" v="376" actId="478"/>
-          <ac:spMkLst>
-            <pc:docMk/>
-            <pc:sldMk cId="1241447715" sldId="412"/>
-            <ac:spMk id="4" creationId="{C687CD28-257F-C880-79F8-D52E9F130F24}"/>
           </ac:spMkLst>
         </pc:spChg>
         <pc:spChg chg="mod">
@@ -754,43 +615,12 @@
             <ac:spMk id="9" creationId="{CE4A8C3F-A22A-478E-7351-CE0303BD008B}"/>
           </ac:spMkLst>
         </pc:spChg>
-        <pc:spChg chg="add del mod">
-          <ac:chgData name="Wegener, Maximilian" userId="00319a47-5df7-4a7f-b5fd-8c1aef3f7443" providerId="ADAL" clId="{CF2CAE99-D8F5-51A4-A68C-79C1C32033F6}" dt="2025-11-07T14:37:12.183" v="375" actId="478"/>
-          <ac:spMkLst>
-            <pc:docMk/>
-            <pc:sldMk cId="1241447715" sldId="412"/>
-            <ac:spMk id="11" creationId="{48E2A070-7D00-A544-9078-7323C141A043}"/>
-          </ac:spMkLst>
-        </pc:spChg>
-        <pc:spChg chg="add del mod">
-          <ac:chgData name="Wegener, Maximilian" userId="00319a47-5df7-4a7f-b5fd-8c1aef3f7443" providerId="ADAL" clId="{CF2CAE99-D8F5-51A4-A68C-79C1C32033F6}" dt="2025-11-07T14:37:18.955" v="377" actId="478"/>
-          <ac:spMkLst>
-            <pc:docMk/>
-            <pc:sldMk cId="1241447715" sldId="412"/>
-            <ac:spMk id="13" creationId="{BEA5FC6B-46B9-7A2B-A104-27162E03EFA7}"/>
-          </ac:spMkLst>
-        </pc:spChg>
         <pc:picChg chg="mod">
           <ac:chgData name="Wegener, Maximilian" userId="00319a47-5df7-4a7f-b5fd-8c1aef3f7443" providerId="ADAL" clId="{CF2CAE99-D8F5-51A4-A68C-79C1C32033F6}" dt="2025-11-07T14:37:21.489" v="378" actId="1076"/>
           <ac:picMkLst>
             <pc:docMk/>
             <pc:sldMk cId="1241447715" sldId="412"/>
             <ac:picMk id="6" creationId="{7A4DC78A-2E25-697B-6FE1-249F29C0556B}"/>
-          </ac:picMkLst>
-        </pc:picChg>
-      </pc:sldChg>
-      <pc:sldChg chg="delSp add del mod">
-        <pc:chgData name="Wegener, Maximilian" userId="00319a47-5df7-4a7f-b5fd-8c1aef3f7443" providerId="ADAL" clId="{CF2CAE99-D8F5-51A4-A68C-79C1C32033F6}" dt="2025-11-07T14:42:36.639" v="540" actId="2696"/>
-        <pc:sldMkLst>
-          <pc:docMk/>
-          <pc:sldMk cId="1897923184" sldId="413"/>
-        </pc:sldMkLst>
-        <pc:picChg chg="del">
-          <ac:chgData name="Wegener, Maximilian" userId="00319a47-5df7-4a7f-b5fd-8c1aef3f7443" providerId="ADAL" clId="{CF2CAE99-D8F5-51A4-A68C-79C1C32033F6}" dt="2025-11-07T14:41:54.186" v="538" actId="478"/>
-          <ac:picMkLst>
-            <pc:docMk/>
-            <pc:sldMk cId="1897923184" sldId="413"/>
-            <ac:picMk id="16" creationId="{C2BCDC64-3064-F58B-AF1F-AE1743587DC5}"/>
           </ac:picMkLst>
         </pc:picChg>
       </pc:sldChg>
@@ -801,21 +631,14 @@
           <pc:sldMk cId="3292860451" sldId="414"/>
         </pc:sldMkLst>
       </pc:sldChg>
-      <pc:sldChg chg="add del">
-        <pc:chgData name="Wegener, Maximilian" userId="00319a47-5df7-4a7f-b5fd-8c1aef3f7443" providerId="ADAL" clId="{CF2CAE99-D8F5-51A4-A68C-79C1C32033F6}" dt="2025-11-07T16:44:15.773" v="1462" actId="2696"/>
-        <pc:sldMkLst>
-          <pc:docMk/>
-          <pc:sldMk cId="1788694980" sldId="415"/>
-        </pc:sldMkLst>
-      </pc:sldChg>
       <pc:sldChg chg="addSp delSp modSp add mod modNotesTx">
-        <pc:chgData name="Wegener, Maximilian" userId="00319a47-5df7-4a7f-b5fd-8c1aef3f7443" providerId="ADAL" clId="{CF2CAE99-D8F5-51A4-A68C-79C1C32033F6}" dt="2025-11-07T18:13:44.793" v="1877" actId="1076"/>
+        <pc:chgData name="Wegener, Maximilian" userId="00319a47-5df7-4a7f-b5fd-8c1aef3f7443" providerId="ADAL" clId="{CF2CAE99-D8F5-51A4-A68C-79C1C32033F6}" dt="2025-11-10T15:09:48.956" v="2046" actId="20577"/>
         <pc:sldMkLst>
           <pc:docMk/>
           <pc:sldMk cId="3368575850" sldId="415"/>
         </pc:sldMkLst>
         <pc:spChg chg="mod">
-          <ac:chgData name="Wegener, Maximilian" userId="00319a47-5df7-4a7f-b5fd-8c1aef3f7443" providerId="ADAL" clId="{CF2CAE99-D8F5-51A4-A68C-79C1C32033F6}" dt="2025-11-07T18:13:44.793" v="1877" actId="1076"/>
+          <ac:chgData name="Wegener, Maximilian" userId="00319a47-5df7-4a7f-b5fd-8c1aef3f7443" providerId="ADAL" clId="{CF2CAE99-D8F5-51A4-A68C-79C1C32033F6}" dt="2025-11-10T15:09:48.956" v="2046" actId="20577"/>
           <ac:spMkLst>
             <pc:docMk/>
             <pc:sldMk cId="3368575850" sldId="415"/>
@@ -828,22 +651,6 @@
             <pc:docMk/>
             <pc:sldMk cId="3368575850" sldId="415"/>
             <ac:spMk id="4" creationId="{2C0E88D1-7BB3-C90E-3DDC-48BA3992414D}"/>
-          </ac:spMkLst>
-        </pc:spChg>
-        <pc:spChg chg="add del mod">
-          <ac:chgData name="Wegener, Maximilian" userId="00319a47-5df7-4a7f-b5fd-8c1aef3f7443" providerId="ADAL" clId="{CF2CAE99-D8F5-51A4-A68C-79C1C32033F6}" dt="2025-11-07T18:09:34.365" v="1704"/>
-          <ac:spMkLst>
-            <pc:docMk/>
-            <pc:sldMk cId="3368575850" sldId="415"/>
-            <ac:spMk id="6" creationId="{1B506B3F-1294-5C12-BE34-DD1020D2DD7F}"/>
-          </ac:spMkLst>
-        </pc:spChg>
-        <pc:spChg chg="add del mod">
-          <ac:chgData name="Wegener, Maximilian" userId="00319a47-5df7-4a7f-b5fd-8c1aef3f7443" providerId="ADAL" clId="{CF2CAE99-D8F5-51A4-A68C-79C1C32033F6}" dt="2025-11-07T18:13:03.778" v="1874"/>
-          <ac:spMkLst>
-            <pc:docMk/>
-            <pc:sldMk cId="3368575850" sldId="415"/>
-            <ac:spMk id="7" creationId="{5EF3F7DE-6959-FF54-F534-DC4A36DFBC47}"/>
           </ac:spMkLst>
         </pc:spChg>
       </pc:sldChg>
@@ -9030,7 +8837,7 @@
           <a:p>
             <a:fld id="{F0B8440E-8C35-1142-93FC-F32DCB9C4FDA}" type="datetimeFigureOut">
               <a:rPr lang="en-US" smtClean="0"/>
-              <a:t>11/5/25</a:t>
+              <a:t>11/10/25</a:t>
             </a:fld>
             <a:endParaRPr lang="en-US"/>
           </a:p>
@@ -23390,7 +23197,7 @@
         <p:spPr>
           <a:xfrm>
             <a:off x="4705141" y="1118522"/>
-            <a:ext cx="6648659" cy="5201424"/>
+            <a:ext cx="6648659" cy="4832092"/>
           </a:xfrm>
           <a:prstGeom prst="rect">
             <a:avLst/>
@@ -23449,16 +23256,10 @@
               <a:buChar char="•"/>
             </a:pPr>
             <a:r>
-              <a:rPr lang="en-US" sz="2400" dirty="0" err="1">
-                <a:latin typeface="Avenir Book" panose="02000503020000020003" pitchFamily="2" charset="0"/>
-              </a:rPr>
-              <a:t>Jupyter</a:t>
-            </a:r>
-            <a:r>
               <a:rPr lang="en-US" sz="2400" dirty="0">
                 <a:latin typeface="Avenir Book" panose="02000503020000020003" pitchFamily="2" charset="0"/>
               </a:rPr>
-              <a:t> notebooks and code are saved in the workspace bucket and will not be deleted</a:t>
+              <a:t>Code notebooks are saved in the workspace bucket and will not be deleted</a:t>
             </a:r>
           </a:p>
           <a:p>
@@ -24625,7 +24426,7 @@
         </p:nvSpPr>
         <p:spPr>
           <a:xfrm>
-            <a:off x="5076967" y="1132764"/>
+            <a:off x="5076967" y="1054108"/>
             <a:ext cx="6819286" cy="5648282"/>
           </a:xfrm>
         </p:spPr>
@@ -24649,7 +24450,7 @@
               <a:rPr lang="en-US" sz="2000" dirty="0">
                 <a:latin typeface="Avenir Book" panose="02000503020000020003" pitchFamily="2" charset="0"/>
               </a:rPr>
-              <a:t>Build your own SQL query within </a:t>
+              <a:t>Build your own SQL query within an analysis environment (</a:t>
             </a:r>
             <a:r>
               <a:rPr lang="en-US" sz="2000" dirty="0" err="1">
@@ -24661,7 +24462,19 @@
               <a:rPr lang="en-US" sz="2000" dirty="0">
                 <a:latin typeface="Avenir Book" panose="02000503020000020003" pitchFamily="2" charset="0"/>
               </a:rPr>
-              <a:t> Notebooks</a:t>
+              <a:t> Notebooks, </a:t>
+            </a:r>
+            <a:r>
+              <a:rPr lang="en-US" sz="2000" dirty="0" err="1">
+                <a:latin typeface="Avenir Book" panose="02000503020000020003" pitchFamily="2" charset="0"/>
+              </a:rPr>
+              <a:t>Rstudio</a:t>
+            </a:r>
+            <a:r>
+              <a:rPr lang="en-US" sz="2000" dirty="0">
+                <a:latin typeface="Avenir Book" panose="02000503020000020003" pitchFamily="2" charset="0"/>
+              </a:rPr>
+              <a:t>, SAS Studio)</a:t>
             </a:r>
             <a:br>
               <a:rPr lang="en-US" sz="2000" dirty="0">
@@ -28144,7 +27957,7 @@
           <a:p>
             <a:r>
               <a:rPr lang="en-US" dirty="0"/>
-              <a:t>Concepts</a:t>
+              <a:t>Concept sets</a:t>
             </a:r>
           </a:p>
         </p:txBody>
@@ -28588,7 +28401,7 @@
           <a:p>
             <a:r>
               <a:rPr lang="en-US" dirty="0"/>
-              <a:t>Observational Medical Outcomes Partnership (OMOP) CDM Concepts</a:t>
+              <a:t>Observational Medical Outcomes Partnership (OMOP) Common Data Model (CDM) Concepts</a:t>
             </a:r>
           </a:p>
           <a:p>
@@ -29139,8 +28952,8 @@
         </p:nvSpPr>
         <p:spPr>
           <a:xfrm>
-            <a:off x="4753811" y="1028343"/>
-            <a:ext cx="6599989" cy="4801314"/>
+            <a:off x="4753811" y="573771"/>
+            <a:ext cx="6599989" cy="5940088"/>
           </a:xfrm>
           <a:prstGeom prst="rect">
             <a:avLst/>
@@ -29415,6 +29228,32 @@
               <a:t> in another site</a:t>
             </a:r>
             <a:endParaRPr lang="en-US" altLang="en-US" dirty="0">
+              <a:latin typeface="Avenir Book" panose="02000503020000020003" pitchFamily="2" charset="0"/>
+            </a:endParaRPr>
+          </a:p>
+          <a:p>
+            <a:endParaRPr lang="en-US" altLang="en-US" b="1" dirty="0">
+              <a:solidFill>
+                <a:srgbClr val="000000"/>
+              </a:solidFill>
+              <a:latin typeface="Avenir Book" panose="02000503020000020003" pitchFamily="2" charset="0"/>
+            </a:endParaRPr>
+          </a:p>
+          <a:p>
+            <a:r>
+              <a:rPr lang="en-US" altLang="en-US" sz="2800" b="1" dirty="0">
+                <a:latin typeface="Avenir Book" panose="02000503020000020003" pitchFamily="2" charset="0"/>
+              </a:rPr>
+              <a:t>*Explore these standardized vocabularies through </a:t>
+            </a:r>
+            <a:r>
+              <a:rPr lang="en-US" altLang="en-US" sz="2800" b="1" dirty="0">
+                <a:latin typeface="Avenir Book" panose="02000503020000020003" pitchFamily="2" charset="0"/>
+                <a:hlinkClick r:id="rId3"/>
+              </a:rPr>
+              <a:t>Athena</a:t>
+            </a:r>
+            <a:endParaRPr lang="en-US" altLang="en-US" sz="2800" b="1" dirty="0">
               <a:latin typeface="Avenir Book" panose="02000503020000020003" pitchFamily="2" charset="0"/>
             </a:endParaRPr>
           </a:p>
@@ -31101,7 +30940,7 @@
         <p:spPr>
           <a:xfrm>
             <a:off x="4478215" y="230346"/>
-            <a:ext cx="7077657" cy="7014515"/>
+            <a:ext cx="7077657" cy="6491129"/>
           </a:xfrm>
         </p:spPr>
         <p:txBody>
@@ -31126,19 +30965,7 @@
               <a:rPr lang="en-US" sz="2000" dirty="0">
                 <a:latin typeface="Avenir Book" panose="02000503020000020003" pitchFamily="2" charset="0"/>
               </a:rPr>
-              <a:t> a </a:t>
-            </a:r>
-            <a:r>
-              <a:rPr lang="en-US" sz="2000" dirty="0" err="1">
-                <a:latin typeface="Avenir Book" panose="02000503020000020003" pitchFamily="2" charset="0"/>
-              </a:rPr>
-              <a:t>Jupyter</a:t>
-            </a:r>
-            <a:r>
-              <a:rPr lang="en-US" sz="2000" dirty="0">
-                <a:latin typeface="Avenir Book" panose="02000503020000020003" pitchFamily="2" charset="0"/>
-              </a:rPr>
-              <a:t> notebook will be generated</a:t>
+              <a:t> the statistical software environment will be generated</a:t>
             </a:r>
             <a:br>
               <a:rPr lang="en-US" sz="2000" dirty="0">
@@ -31215,7 +31042,56 @@
               <a:rPr lang="en-US" sz="2000" dirty="0">
                 <a:latin typeface="Avenir Book" panose="02000503020000020003" pitchFamily="2" charset="0"/>
               </a:rPr>
-              <a:t>Datasets from queries will be saved in </a:t>
+              <a:t>Write your own code to clean and manipulate data</a:t>
+            </a:r>
+          </a:p>
+          <a:p>
+            <a:endParaRPr lang="en-US" sz="2000" dirty="0">
+              <a:latin typeface="Avenir Book" panose="02000503020000020003" pitchFamily="2" charset="0"/>
+            </a:endParaRPr>
+          </a:p>
+          <a:p>
+            <a:r>
+              <a:rPr lang="en-US" sz="2000" dirty="0">
+                <a:latin typeface="Avenir Book" panose="02000503020000020003" pitchFamily="2" charset="0"/>
+              </a:rPr>
+              <a:t>Code Snippets to </a:t>
+            </a:r>
+            <a:r>
+              <a:rPr lang="en-US" sz="2000" b="1" dirty="0">
+                <a:latin typeface="Avenir Book" panose="02000503020000020003" pitchFamily="2" charset="0"/>
+              </a:rPr>
+              <a:t>save</a:t>
+            </a:r>
+            <a:r>
+              <a:rPr lang="en-US" sz="2000" dirty="0">
+                <a:latin typeface="Avenir Book" panose="02000503020000020003" pitchFamily="2" charset="0"/>
+              </a:rPr>
+              <a:t> </a:t>
+            </a:r>
+            <a:r>
+              <a:rPr lang="en-US" sz="2000" b="1" dirty="0">
+                <a:latin typeface="Avenir Book" panose="02000503020000020003" pitchFamily="2" charset="0"/>
+              </a:rPr>
+              <a:t>data</a:t>
+            </a:r>
+            <a:r>
+              <a:rPr lang="en-US" sz="2000" dirty="0">
+                <a:latin typeface="Avenir Book" panose="02000503020000020003" pitchFamily="2" charset="0"/>
+              </a:rPr>
+              <a:t> to and </a:t>
+            </a:r>
+            <a:r>
+              <a:rPr lang="en-US" sz="2000" b="1" dirty="0">
+                <a:latin typeface="Avenir Book" panose="02000503020000020003" pitchFamily="2" charset="0"/>
+              </a:rPr>
+              <a:t>pull data </a:t>
+            </a:r>
+            <a:r>
+              <a:rPr lang="en-US" sz="2000" dirty="0">
+                <a:latin typeface="Avenir Book" panose="02000503020000020003" pitchFamily="2" charset="0"/>
+              </a:rPr>
+              <a:t>from </a:t>
             </a:r>
             <a:r>
               <a:rPr lang="en-US" sz="2000" i="1" dirty="0">
@@ -31229,45 +31105,26 @@
               </a:rPr>
               <a:t> on Google cloud</a:t>
             </a:r>
-            <a:br>
-              <a:rPr lang="en-US" sz="2000" dirty="0">
-                <a:latin typeface="Avenir Book" panose="02000503020000020003" pitchFamily="2" charset="0"/>
-              </a:rPr>
-            </a:br>
-            <a:endParaRPr lang="en-US" sz="800" dirty="0">
-              <a:latin typeface="Avenir Book" panose="02000503020000020003" pitchFamily="2" charset="0"/>
-            </a:endParaRPr>
-          </a:p>
-          <a:p>
-            <a:r>
-              <a:rPr lang="en-US" sz="2000" dirty="0">
-                <a:latin typeface="Avenir Book" panose="02000503020000020003" pitchFamily="2" charset="0"/>
-              </a:rPr>
-              <a:t>You can update/manipulate code to meet your needs</a:t>
-            </a:r>
-          </a:p>
-          <a:p>
-            <a:pPr lvl="1">
-              <a:buFont typeface="Courier New" panose="02070309020205020404" pitchFamily="49" charset="0"/>
-              <a:buChar char="o"/>
-            </a:pPr>
+          </a:p>
+          <a:p>
+            <a:pPr lvl="1"/>
             <a:r>
               <a:rPr lang="en-US" sz="1800" dirty="0">
                 <a:latin typeface="Avenir Book" panose="02000503020000020003" pitchFamily="2" charset="0"/>
               </a:rPr>
-              <a:t>i.e. save datasets so you don’t have to rerun the queries every time</a:t>
-            </a:r>
-          </a:p>
-          <a:p>
-            <a:pPr lvl="1">
-              <a:buFont typeface="Courier New" panose="02070309020205020404" pitchFamily="49" charset="0"/>
-              <a:buChar char="o"/>
-            </a:pPr>
+              <a:t>Once you do this, you don’t have to rerun the queries every time just import the cleaned data you saved (*</a:t>
+            </a:r>
+            <a:r>
+              <a:rPr lang="en-US" sz="1800" b="1" dirty="0">
+                <a:latin typeface="Avenir Book" panose="02000503020000020003" pitchFamily="2" charset="0"/>
+              </a:rPr>
+              <a:t>Note</a:t>
+            </a:r>
             <a:r>
               <a:rPr lang="en-US" sz="1800" dirty="0">
                 <a:latin typeface="Avenir Book" panose="02000503020000020003" pitchFamily="2" charset="0"/>
               </a:rPr>
-              <a:t>Handle duplicates</a:t>
+              <a:t>: can be done in separate notebook)</a:t>
             </a:r>
           </a:p>
           <a:p>
@@ -31278,26 +31135,6 @@
             <a:endParaRPr lang="en-US" sz="900" dirty="0">
               <a:latin typeface="Avenir Book" panose="02000503020000020003" pitchFamily="2" charset="0"/>
             </a:endParaRPr>
-          </a:p>
-          <a:p>
-            <a:r>
-              <a:rPr lang="en-US" sz="2000" dirty="0">
-                <a:latin typeface="Avenir Book" panose="02000503020000020003" pitchFamily="2" charset="0"/>
-              </a:rPr>
-              <a:t>There are also helpful tools included</a:t>
-            </a:r>
-          </a:p>
-          <a:p>
-            <a:pPr lvl="1">
-              <a:buFont typeface="Courier New" panose="02070309020205020404" pitchFamily="49" charset="0"/>
-              <a:buChar char="o"/>
-            </a:pPr>
-            <a:r>
-              <a:rPr lang="en-US" sz="1800" dirty="0">
-                <a:latin typeface="Avenir Book" panose="02000503020000020003" pitchFamily="2" charset="0"/>
-              </a:rPr>
-              <a:t>Code snippets</a:t>
-            </a:r>
           </a:p>
         </p:txBody>
       </p:sp>
@@ -32210,6 +32047,25 @@
               </a:rPr>
               <a:t>for current course</a:t>
             </a:r>
+          </a:p>
+          <a:p>
+            <a:pPr lvl="1"/>
+            <a:r>
+              <a:rPr lang="en-US" sz="1600" dirty="0">
+                <a:latin typeface="Avenir Book" panose="02000503020000020003" pitchFamily="2" charset="0"/>
+              </a:rPr>
+              <a:t>Sign up for the All of Us live demonstration class </a:t>
+            </a:r>
+            <a:r>
+              <a:rPr lang="en-US" sz="1600" dirty="0">
+                <a:latin typeface="Avenir Book" panose="02000503020000020003" pitchFamily="2" charset="0"/>
+                <a:hlinkClick r:id="rId4"/>
+              </a:rPr>
+              <a:t>here</a:t>
+            </a:r>
+            <a:endParaRPr lang="en-US" sz="1600" dirty="0">
+              <a:latin typeface="Avenir Book" panose="02000503020000020003" pitchFamily="2" charset="0"/>
+            </a:endParaRPr>
           </a:p>
         </p:txBody>
       </p:sp>

</xml_diff>